<commit_message>
docs: ppt archi diagram
</commit_message>
<xml_diff>
--- a/docs/images/Quick Start architecture diagram.pptx
+++ b/docs/images/Quick Start architecture diagram.pptx
@@ -223,7 +223,7 @@
           <a:p>
             <a:fld id="{49A7721D-1176-A640-AC48-B82F78C92D56}" type="datetimeFigureOut">
               <a:rPr lang="en-US" smtClean="0"/>
-              <a:t>8/17/20</a:t>
+              <a:t>6/5/22</a:t>
             </a:fld>
             <a:endParaRPr lang="en-US" dirty="0"/>
           </a:p>
@@ -400,7 +400,7 @@
           <a:p>
             <a:fld id="{C884A089-FB25-6D46-9D21-F0F04A18BCA8}" type="datetimeFigureOut">
               <a:rPr lang="en-US" smtClean="0"/>
-              <a:t>8/17/20</a:t>
+              <a:t>6/5/22</a:t>
             </a:fld>
             <a:endParaRPr lang="en-US" dirty="0"/>
           </a:p>
@@ -1086,10 +1086,10 @@
       </p:grpSpPr>
       <p:sp>
         <p:nvSpPr>
-          <p:cNvPr id="53" name="Rectangle 52">
+          <p:cNvPr id="7" name="Rectangle 6">
             <a:extLst>
               <a:ext uri="{FF2B5EF4-FFF2-40B4-BE49-F238E27FC236}">
-                <a16:creationId xmlns:a16="http://schemas.microsoft.com/office/drawing/2014/main" id="{B2229856-53BE-4544-BF16-865F190EA5EB}"/>
+                <a16:creationId xmlns:a16="http://schemas.microsoft.com/office/drawing/2014/main" id="{9B4B83F5-DBDE-5145-8C3D-869D8FCD01B1}"/>
               </a:ext>
             </a:extLst>
           </p:cNvPr>
@@ -1098,7 +1098,68 @@
         </p:nvSpPr>
         <p:spPr>
           <a:xfrm>
-            <a:off x="5682206" y="1563311"/>
+            <a:off x="626991" y="261677"/>
+            <a:ext cx="9930087" cy="5328000"/>
+          </a:xfrm>
+          <a:prstGeom prst="rect">
+            <a:avLst/>
+          </a:prstGeom>
+          <a:solidFill>
+            <a:srgbClr val="FFFFFF"/>
+          </a:solidFill>
+          <a:ln w="12700">
+            <a:noFill/>
+          </a:ln>
+        </p:spPr>
+        <p:style>
+          <a:lnRef idx="2">
+            <a:schemeClr val="accent1">
+              <a:shade val="50000"/>
+            </a:schemeClr>
+          </a:lnRef>
+          <a:fillRef idx="1">
+            <a:schemeClr val="accent1"/>
+          </a:fillRef>
+          <a:effectRef idx="0">
+            <a:schemeClr val="accent1"/>
+          </a:effectRef>
+          <a:fontRef idx="minor">
+            <a:schemeClr val="lt1"/>
+          </a:fontRef>
+        </p:style>
+        <p:txBody>
+          <a:bodyPr rot="0" spcFirstLastPara="0" vertOverflow="overflow" horzOverflow="overflow" vert="horz" wrap="square" lIns="91440" tIns="91440" rIns="91440" bIns="45720" numCol="1" spcCol="0" rtlCol="0" fromWordArt="0" anchor="t" anchorCtr="0" forceAA="0" compatLnSpc="1">
+            <a:prstTxWarp prst="textNoShape">
+              <a:avLst/>
+            </a:prstTxWarp>
+            <a:noAutofit/>
+          </a:bodyPr>
+          <a:lstStyle/>
+          <a:p>
+            <a:pPr algn="l"/>
+            <a:endParaRPr lang="en-US" sz="1200" dirty="0">
+              <a:solidFill>
+                <a:schemeClr val="tx2"/>
+              </a:solidFill>
+            </a:endParaRPr>
+          </a:p>
+        </p:txBody>
+      </p:sp>
+      <p:sp>
+        <p:nvSpPr>
+          <p:cNvPr id="53" name="Rectangle 52">
+            <a:extLst>
+              <a:ext uri="{FF2B5EF4-FFF2-40B4-BE49-F238E27FC236}">
+                <a16:creationId xmlns:a16="http://schemas.microsoft.com/office/drawing/2014/main" id="{B2229856-53BE-4544-BF16-865F190EA5EB}"/>
+              </a:ext>
+            </a:extLst>
+          </p:cNvPr>
+          <p:cNvSpPr/>
+          <p:nvPr/>
+        </p:nvSpPr>
+        <p:spPr>
+          <a:xfrm>
+            <a:off x="4343739" y="1563311"/>
             <a:ext cx="2474928" cy="1787440"/>
           </a:xfrm>
           <a:prstGeom prst="rect">
@@ -1149,90 +1210,6 @@
                 <a:cs typeface="Arial" panose="020B0604020202020204" pitchFamily="34" charset="0"/>
               </a:rPr>
               <a:t>Public subnet</a:t>
-            </a:r>
-          </a:p>
-        </p:txBody>
-      </p:sp>
-      <p:pic>
-        <p:nvPicPr>
-          <p:cNvPr id="54" name="Graphic 36">
-            <a:extLst>
-              <a:ext uri="{FF2B5EF4-FFF2-40B4-BE49-F238E27FC236}">
-                <a16:creationId xmlns:a16="http://schemas.microsoft.com/office/drawing/2014/main" id="{2FEAF0B5-3330-184C-AE88-A8058CB50B78}"/>
-              </a:ext>
-            </a:extLst>
-          </p:cNvPr>
-          <p:cNvPicPr>
-            <a:picLocks noChangeAspect="1"/>
-          </p:cNvPicPr>
-          <p:nvPr/>
-        </p:nvPicPr>
-        <p:blipFill>
-          <a:blip r:embed="rId2">
-            <a:extLst>
-              <a:ext uri="{BEBA8EAE-BF5A-486C-A8C5-ECC9F3942E4B}">
-                <a14:imgProps xmlns:a14="http://schemas.microsoft.com/office/drawing/2010/main">
-                  <a14:imgLayer r:embed="rId3">
-                    <a14:imgEffect>
-                      <a14:artisticBlur/>
-                    </a14:imgEffect>
-                  </a14:imgLayer>
-                </a14:imgProps>
-              </a:ext>
-            </a:extLst>
-          </a:blip>
-          <a:stretch>
-            <a:fillRect/>
-          </a:stretch>
-        </p:blipFill>
-        <p:spPr>
-          <a:xfrm>
-            <a:off x="6123995" y="2290386"/>
-            <a:ext cx="469900" cy="469900"/>
-          </a:xfrm>
-          <a:prstGeom prst="rect">
-            <a:avLst/>
-          </a:prstGeom>
-          <a:effectLst>
-            <a:softEdge rad="0"/>
-          </a:effectLst>
-        </p:spPr>
-      </p:pic>
-      <p:sp>
-        <p:nvSpPr>
-          <p:cNvPr id="55" name="TextBox 54">
-            <a:extLst>
-              <a:ext uri="{FF2B5EF4-FFF2-40B4-BE49-F238E27FC236}">
-                <a16:creationId xmlns:a16="http://schemas.microsoft.com/office/drawing/2014/main" id="{C8AACC3F-AAED-A249-8AD2-D71F2C19591E}"/>
-              </a:ext>
-            </a:extLst>
-          </p:cNvPr>
-          <p:cNvSpPr txBox="1"/>
-          <p:nvPr/>
-        </p:nvSpPr>
-        <p:spPr>
-          <a:xfrm>
-            <a:off x="5805157" y="2739378"/>
-            <a:ext cx="1116578" cy="276999"/>
-          </a:xfrm>
-          <a:prstGeom prst="rect">
-            <a:avLst/>
-          </a:prstGeom>
-          <a:noFill/>
-        </p:spPr>
-        <p:txBody>
-          <a:bodyPr wrap="square" rtlCol="0" anchor="t">
-            <a:spAutoFit/>
-          </a:bodyPr>
-          <a:lstStyle/>
-          <a:p>
-            <a:pPr algn="ctr"/>
-            <a:r>
-              <a:rPr lang="en-US" sz="1200" dirty="0">
-                <a:latin typeface="Arial" panose="020B0604020202020204" pitchFamily="34" charset="0"/>
-                <a:cs typeface="Arial" panose="020B0604020202020204" pitchFamily="34" charset="0"/>
-              </a:rPr>
-              <a:t>Bastion host</a:t>
             </a:r>
           </a:p>
         </p:txBody>
@@ -1320,8 +1297,8 @@
         </p:nvSpPr>
         <p:spPr>
           <a:xfrm>
-            <a:off x="898444" y="1195189"/>
-            <a:ext cx="7741839" cy="4075311"/>
+            <a:off x="898445" y="1195189"/>
+            <a:ext cx="6456512" cy="4075311"/>
           </a:xfrm>
           <a:prstGeom prst="rect">
             <a:avLst/>
@@ -1457,7 +1434,7 @@
         <p:spPr>
           <a:xfrm>
             <a:off x="706503" y="341189"/>
-            <a:ext cx="9585599" cy="5157911"/>
+            <a:ext cx="8041902" cy="5157911"/>
           </a:xfrm>
           <a:prstGeom prst="rect">
             <a:avLst/>
@@ -1577,10 +1554,46 @@
       </p:sp>
       <p:pic>
         <p:nvPicPr>
-          <p:cNvPr id="61" name="Graphic 60">
+          <p:cNvPr id="62" name="Graphic 61">
             <a:extLst>
               <a:ext uri="{FF2B5EF4-FFF2-40B4-BE49-F238E27FC236}">
-                <a16:creationId xmlns:a16="http://schemas.microsoft.com/office/drawing/2014/main" id="{A3C1AC7C-AF13-3046-A016-16841DAF17C6}"/>
+                <a16:creationId xmlns:a16="http://schemas.microsoft.com/office/drawing/2014/main" id="{89490AF9-EFA6-8440-9A79-E963D0EE7295}"/>
+              </a:ext>
+            </a:extLst>
+          </p:cNvPr>
+          <p:cNvPicPr>
+            <a:picLocks noChangeAspect="1"/>
+          </p:cNvPicPr>
+          <p:nvPr/>
+        </p:nvPicPr>
+        <p:blipFill>
+          <a:blip r:embed="rId2">
+            <a:extLst>
+              <a:ext uri="{96DAC541-7B7A-43D3-8B79-37D633B846F1}">
+                <asvg:svgBlip xmlns:asvg="http://schemas.microsoft.com/office/drawing/2016/SVG/main" r:embed="rId3"/>
+              </a:ext>
+            </a:extLst>
+          </a:blip>
+          <a:stretch>
+            <a:fillRect/>
+          </a:stretch>
+        </p:blipFill>
+        <p:spPr>
+          <a:xfrm>
+            <a:off x="706504" y="341189"/>
+            <a:ext cx="330200" cy="330200"/>
+          </a:xfrm>
+          <a:prstGeom prst="rect">
+            <a:avLst/>
+          </a:prstGeom>
+        </p:spPr>
+      </p:pic>
+      <p:pic>
+        <p:nvPicPr>
+          <p:cNvPr id="63" name="Graphic 62">
+            <a:extLst>
+              <a:ext uri="{FF2B5EF4-FFF2-40B4-BE49-F238E27FC236}">
+                <a16:creationId xmlns:a16="http://schemas.microsoft.com/office/drawing/2014/main" id="{1FB42D1C-3EBE-4F44-AEEF-747AE0502066}"/>
               </a:ext>
             </a:extLst>
           </p:cNvPr>
@@ -1603,7 +1616,7 @@
         </p:blipFill>
         <p:spPr>
           <a:xfrm>
-            <a:off x="4657956" y="2006402"/>
+            <a:off x="898445" y="1195189"/>
             <a:ext cx="330200" cy="330200"/>
           </a:xfrm>
           <a:prstGeom prst="rect">
@@ -1613,10 +1626,10 @@
       </p:pic>
       <p:pic>
         <p:nvPicPr>
-          <p:cNvPr id="62" name="Graphic 61">
+          <p:cNvPr id="64" name="Graphic 63">
             <a:extLst>
               <a:ext uri="{FF2B5EF4-FFF2-40B4-BE49-F238E27FC236}">
-                <a16:creationId xmlns:a16="http://schemas.microsoft.com/office/drawing/2014/main" id="{89490AF9-EFA6-8440-9A79-E963D0EE7295}"/>
+                <a16:creationId xmlns:a16="http://schemas.microsoft.com/office/drawing/2014/main" id="{EF801B6A-5039-A74B-9F9A-63AABA56CBE2}"/>
               </a:ext>
             </a:extLst>
           </p:cNvPr>
@@ -1639,8 +1652,8 @@
         </p:blipFill>
         <p:spPr>
           <a:xfrm>
-            <a:off x="706504" y="341189"/>
-            <a:ext cx="330200" cy="330200"/>
+            <a:off x="1465085" y="1551162"/>
+            <a:ext cx="274320" cy="274320"/>
           </a:xfrm>
           <a:prstGeom prst="rect">
             <a:avLst/>
@@ -1649,10 +1662,10 @@
       </p:pic>
       <p:pic>
         <p:nvPicPr>
-          <p:cNvPr id="63" name="Graphic 62">
+          <p:cNvPr id="65" name="Graphic 64">
             <a:extLst>
               <a:ext uri="{FF2B5EF4-FFF2-40B4-BE49-F238E27FC236}">
-                <a16:creationId xmlns:a16="http://schemas.microsoft.com/office/drawing/2014/main" id="{1FB42D1C-3EBE-4F44-AEEF-747AE0502066}"/>
+                <a16:creationId xmlns:a16="http://schemas.microsoft.com/office/drawing/2014/main" id="{AC206ECC-58BE-5848-AAD5-D6896DE2C67E}"/>
               </a:ext>
             </a:extLst>
           </p:cNvPr>
@@ -1675,78 +1688,6 @@
         </p:blipFill>
         <p:spPr>
           <a:xfrm>
-            <a:off x="898445" y="1195189"/>
-            <a:ext cx="330200" cy="330200"/>
-          </a:xfrm>
-          <a:prstGeom prst="rect">
-            <a:avLst/>
-          </a:prstGeom>
-        </p:spPr>
-      </p:pic>
-      <p:pic>
-        <p:nvPicPr>
-          <p:cNvPr id="64" name="Graphic 63">
-            <a:extLst>
-              <a:ext uri="{FF2B5EF4-FFF2-40B4-BE49-F238E27FC236}">
-                <a16:creationId xmlns:a16="http://schemas.microsoft.com/office/drawing/2014/main" id="{EF801B6A-5039-A74B-9F9A-63AABA56CBE2}"/>
-              </a:ext>
-            </a:extLst>
-          </p:cNvPr>
-          <p:cNvPicPr>
-            <a:picLocks noChangeAspect="1"/>
-          </p:cNvPicPr>
-          <p:nvPr/>
-        </p:nvPicPr>
-        <p:blipFill>
-          <a:blip r:embed="rId10">
-            <a:extLst>
-              <a:ext uri="{96DAC541-7B7A-43D3-8B79-37D633B846F1}">
-                <asvg:svgBlip xmlns:asvg="http://schemas.microsoft.com/office/drawing/2016/SVG/main" r:embed="rId11"/>
-              </a:ext>
-            </a:extLst>
-          </a:blip>
-          <a:stretch>
-            <a:fillRect/>
-          </a:stretch>
-        </p:blipFill>
-        <p:spPr>
-          <a:xfrm>
-            <a:off x="1465085" y="1551162"/>
-            <a:ext cx="274320" cy="274320"/>
-          </a:xfrm>
-          <a:prstGeom prst="rect">
-            <a:avLst/>
-          </a:prstGeom>
-        </p:spPr>
-      </p:pic>
-      <p:pic>
-        <p:nvPicPr>
-          <p:cNvPr id="65" name="Graphic 64">
-            <a:extLst>
-              <a:ext uri="{FF2B5EF4-FFF2-40B4-BE49-F238E27FC236}">
-                <a16:creationId xmlns:a16="http://schemas.microsoft.com/office/drawing/2014/main" id="{AC206ECC-58BE-5848-AAD5-D6896DE2C67E}"/>
-              </a:ext>
-            </a:extLst>
-          </p:cNvPr>
-          <p:cNvPicPr>
-            <a:picLocks noChangeAspect="1"/>
-          </p:cNvPicPr>
-          <p:nvPr/>
-        </p:nvPicPr>
-        <p:blipFill>
-          <a:blip r:embed="rId12">
-            <a:extLst>
-              <a:ext uri="{96DAC541-7B7A-43D3-8B79-37D633B846F1}">
-                <asvg:svgBlip xmlns:asvg="http://schemas.microsoft.com/office/drawing/2016/SVG/main" r:embed="rId13"/>
-              </a:ext>
-            </a:extLst>
-          </a:blip>
-          <a:stretch>
-            <a:fillRect/>
-          </a:stretch>
-        </p:blipFill>
-        <p:spPr>
-          <a:xfrm>
             <a:off x="1468789" y="3648856"/>
             <a:ext cx="274320" cy="274320"/>
           </a:xfrm>
@@ -1769,7 +1710,7 @@
         </p:nvSpPr>
         <p:spPr>
           <a:xfrm>
-            <a:off x="1456147" y="2739378"/>
+            <a:off x="2125960" y="2681210"/>
             <a:ext cx="1153178" cy="276999"/>
           </a:xfrm>
           <a:prstGeom prst="rect">
@@ -1809,10 +1750,10 @@
           <p:nvPr/>
         </p:nvPicPr>
         <p:blipFill>
-          <a:blip r:embed="rId14">
+          <a:blip r:embed="rId10">
             <a:extLst>
               <a:ext uri="{96DAC541-7B7A-43D3-8B79-37D633B846F1}">
-                <asvg:svgBlip xmlns:asvg="http://schemas.microsoft.com/office/drawing/2016/SVG/main" r:embed="rId15"/>
+                <asvg:svgBlip xmlns:asvg="http://schemas.microsoft.com/office/drawing/2016/SVG/main" r:embed="rId11"/>
               </a:ext>
             </a:extLst>
           </a:blip>
@@ -1822,79 +1763,7 @@
         </p:blipFill>
         <p:spPr>
           <a:xfrm>
-            <a:off x="1799231" y="2280711"/>
-            <a:ext cx="469900" cy="469900"/>
-          </a:xfrm>
-          <a:prstGeom prst="rect">
-            <a:avLst/>
-          </a:prstGeom>
-        </p:spPr>
-      </p:pic>
-      <p:pic>
-        <p:nvPicPr>
-          <p:cNvPr id="68" name="Graphic 67">
-            <a:extLst>
-              <a:ext uri="{FF2B5EF4-FFF2-40B4-BE49-F238E27FC236}">
-                <a16:creationId xmlns:a16="http://schemas.microsoft.com/office/drawing/2014/main" id="{2579B510-E12C-5347-948E-CEB10E127BDC}"/>
-              </a:ext>
-            </a:extLst>
-          </p:cNvPr>
-          <p:cNvPicPr>
-            <a:picLocks noChangeAspect="1"/>
-          </p:cNvPicPr>
-          <p:nvPr/>
-        </p:nvPicPr>
-        <p:blipFill>
-          <a:blip r:embed="rId16">
-            <a:extLst>
-              <a:ext uri="{96DAC541-7B7A-43D3-8B79-37D633B846F1}">
-                <asvg:svgBlip xmlns:asvg="http://schemas.microsoft.com/office/drawing/2016/SVG/main" r:embed="rId17"/>
-              </a:ext>
-            </a:extLst>
-          </a:blip>
-          <a:stretch>
-            <a:fillRect/>
-          </a:stretch>
-        </p:blipFill>
-        <p:spPr>
-          <a:xfrm>
-            <a:off x="2998150" y="2280596"/>
-            <a:ext cx="469900" cy="469900"/>
-          </a:xfrm>
-          <a:prstGeom prst="rect">
-            <a:avLst/>
-          </a:prstGeom>
-        </p:spPr>
-      </p:pic>
-      <p:pic>
-        <p:nvPicPr>
-          <p:cNvPr id="69" name="Graphic 68">
-            <a:extLst>
-              <a:ext uri="{FF2B5EF4-FFF2-40B4-BE49-F238E27FC236}">
-                <a16:creationId xmlns:a16="http://schemas.microsoft.com/office/drawing/2014/main" id="{F48A665A-D21C-3B49-B86D-3A8663AD2FD5}"/>
-              </a:ext>
-            </a:extLst>
-          </p:cNvPr>
-          <p:cNvPicPr>
-            <a:picLocks noChangeAspect="1"/>
-          </p:cNvPicPr>
-          <p:nvPr/>
-        </p:nvPicPr>
-        <p:blipFill>
-          <a:blip r:embed="rId18">
-            <a:extLst>
-              <a:ext uri="{96DAC541-7B7A-43D3-8B79-37D633B846F1}">
-                <asvg:svgBlip xmlns:asvg="http://schemas.microsoft.com/office/drawing/2016/SVG/main" r:embed="rId19"/>
-              </a:ext>
-            </a:extLst>
-          </a:blip>
-          <a:stretch>
-            <a:fillRect/>
-          </a:stretch>
-        </p:blipFill>
-        <p:spPr>
-          <a:xfrm>
-            <a:off x="2444738" y="4141116"/>
+            <a:off x="2467599" y="2217186"/>
             <a:ext cx="469900" cy="469900"/>
           </a:xfrm>
           <a:prstGeom prst="rect">
@@ -1904,10 +1773,10 @@
       </p:pic>
       <p:sp>
         <p:nvSpPr>
-          <p:cNvPr id="70" name="TextBox 69">
+          <p:cNvPr id="73" name="TextBox 72">
             <a:extLst>
               <a:ext uri="{FF2B5EF4-FFF2-40B4-BE49-F238E27FC236}">
-                <a16:creationId xmlns:a16="http://schemas.microsoft.com/office/drawing/2014/main" id="{33A7CEB2-7515-104B-A313-63BC9587BB83}"/>
+                <a16:creationId xmlns:a16="http://schemas.microsoft.com/office/drawing/2014/main" id="{5E4E5C6C-AAF8-A848-B927-163A8BD32903}"/>
               </a:ext>
             </a:extLst>
           </p:cNvPr>
@@ -1916,122 +1785,8 @@
         </p:nvSpPr>
         <p:spPr>
           <a:xfrm>
-            <a:off x="1923035" y="4637749"/>
-            <a:ext cx="1513305" cy="461665"/>
-          </a:xfrm>
-          <a:prstGeom prst="rect">
-            <a:avLst/>
-          </a:prstGeom>
-          <a:noFill/>
-        </p:spPr>
-        <p:txBody>
-          <a:bodyPr wrap="square" rtlCol="0">
-            <a:spAutoFit/>
-          </a:bodyPr>
-          <a:lstStyle/>
-          <a:p>
-            <a:pPr algn="ctr"/>
-            <a:r>
-              <a:rPr lang="en-US" sz="1200" dirty="0">
-                <a:latin typeface="Arial" panose="020B0604020202020204" pitchFamily="34" charset="0"/>
-                <a:cs typeface="Arial" panose="020B0604020202020204" pitchFamily="34" charset="0"/>
-              </a:rPr>
-              <a:t>&lt;Your product instances&gt;</a:t>
-            </a:r>
-          </a:p>
-        </p:txBody>
-      </p:sp>
-      <p:sp>
-        <p:nvSpPr>
-          <p:cNvPr id="71" name="TextBox 70">
-            <a:extLst>
-              <a:ext uri="{FF2B5EF4-FFF2-40B4-BE49-F238E27FC236}">
-                <a16:creationId xmlns:a16="http://schemas.microsoft.com/office/drawing/2014/main" id="{A38373D4-E4DA-644B-B76B-3BC72F0E1195}"/>
-              </a:ext>
-            </a:extLst>
-          </p:cNvPr>
-          <p:cNvSpPr txBox="1"/>
-          <p:nvPr/>
-        </p:nvSpPr>
-        <p:spPr>
-          <a:xfrm>
-            <a:off x="2665865" y="2739378"/>
-            <a:ext cx="1132415" cy="276999"/>
-          </a:xfrm>
-          <a:prstGeom prst="rect">
-            <a:avLst/>
-          </a:prstGeom>
-          <a:noFill/>
-        </p:spPr>
-        <p:txBody>
-          <a:bodyPr wrap="square" rtlCol="0" anchor="t">
-            <a:spAutoFit/>
-          </a:bodyPr>
-          <a:lstStyle/>
-          <a:p>
-            <a:pPr algn="ctr"/>
-            <a:r>
-              <a:rPr lang="en-US" sz="1200" dirty="0">
-                <a:latin typeface="Arial" panose="020B0604020202020204" pitchFamily="34" charset="0"/>
-                <a:cs typeface="Arial" panose="020B0604020202020204" pitchFamily="34" charset="0"/>
-              </a:rPr>
-              <a:t>Bastion host</a:t>
-            </a:r>
-          </a:p>
-        </p:txBody>
-      </p:sp>
-      <p:pic>
-        <p:nvPicPr>
-          <p:cNvPr id="72" name="Graphic 71">
-            <a:extLst>
-              <a:ext uri="{FF2B5EF4-FFF2-40B4-BE49-F238E27FC236}">
-                <a16:creationId xmlns:a16="http://schemas.microsoft.com/office/drawing/2014/main" id="{7D0A0466-3950-2848-86E4-CC79DB981379}"/>
-              </a:ext>
-            </a:extLst>
-          </p:cNvPr>
-          <p:cNvPicPr>
-            <a:picLocks noChangeAspect="1"/>
-          </p:cNvPicPr>
-          <p:nvPr/>
-        </p:nvPicPr>
-        <p:blipFill>
-          <a:blip r:embed="rId20">
-            <a:extLst>
-              <a:ext uri="{96DAC541-7B7A-43D3-8B79-37D633B846F1}">
-                <asvg:svgBlip xmlns:asvg="http://schemas.microsoft.com/office/drawing/2016/SVG/main" r:embed="rId21"/>
-              </a:ext>
-            </a:extLst>
-          </a:blip>
-          <a:stretch>
-            <a:fillRect/>
-          </a:stretch>
-        </p:blipFill>
-        <p:spPr>
-          <a:xfrm>
-            <a:off x="9180861" y="2812510"/>
-            <a:ext cx="591034" cy="591034"/>
-          </a:xfrm>
-          <a:prstGeom prst="rect">
-            <a:avLst/>
-          </a:prstGeom>
-        </p:spPr>
-      </p:pic>
-      <p:sp>
-        <p:nvSpPr>
-          <p:cNvPr id="73" name="TextBox 72">
-            <a:extLst>
-              <a:ext uri="{FF2B5EF4-FFF2-40B4-BE49-F238E27FC236}">
-                <a16:creationId xmlns:a16="http://schemas.microsoft.com/office/drawing/2014/main" id="{5E4E5C6C-AAF8-A848-B927-163A8BD32903}"/>
-              </a:ext>
-            </a:extLst>
-          </p:cNvPr>
-          <p:cNvSpPr txBox="1"/>
-          <p:nvPr/>
-        </p:nvSpPr>
-        <p:spPr>
-          <a:xfrm>
-            <a:off x="8640283" y="3394818"/>
-            <a:ext cx="1651819" cy="307777"/>
+            <a:off x="7328641" y="2691981"/>
+            <a:ext cx="1419764" cy="523220"/>
           </a:xfrm>
           <a:prstGeom prst="rect">
             <a:avLst/>
@@ -2050,7 +1805,7 @@
                 <a:latin typeface="Arial" panose="020B0604020202020204" pitchFamily="34" charset="0"/>
                 <a:cs typeface="Arial" panose="020B0604020202020204" pitchFamily="34" charset="0"/>
               </a:rPr>
-              <a:t>Amazon S3</a:t>
+              <a:t>AWS Systems Manager</a:t>
             </a:r>
           </a:p>
         </p:txBody>
@@ -2069,8 +1824,8 @@
         </p:nvSpPr>
         <p:spPr>
           <a:xfrm>
-            <a:off x="8640283" y="4640332"/>
-            <a:ext cx="1651819" cy="307777"/>
+            <a:off x="8773800" y="4596403"/>
+            <a:ext cx="1783278" cy="523220"/>
           </a:xfrm>
           <a:prstGeom prst="rect">
             <a:avLst/>
@@ -2089,122 +1844,11 @@
                 <a:latin typeface="Arial" panose="020B0604020202020204" pitchFamily="34" charset="0"/>
                 <a:cs typeface="Arial" panose="020B0604020202020204" pitchFamily="34" charset="0"/>
               </a:rPr>
-              <a:t>Amazon Route 53</a:t>
+              <a:t>Remote repositories for RHEL 8</a:t>
             </a:r>
           </a:p>
         </p:txBody>
       </p:sp>
-      <p:pic>
-        <p:nvPicPr>
-          <p:cNvPr id="75" name="Graphic 74">
-            <a:extLst>
-              <a:ext uri="{FF2B5EF4-FFF2-40B4-BE49-F238E27FC236}">
-                <a16:creationId xmlns:a16="http://schemas.microsoft.com/office/drawing/2014/main" id="{3D07D26E-A1C3-1548-BAD2-2E38B9F7B484}"/>
-              </a:ext>
-            </a:extLst>
-          </p:cNvPr>
-          <p:cNvPicPr>
-            <a:picLocks noChangeAspect="1"/>
-          </p:cNvPicPr>
-          <p:nvPr/>
-        </p:nvPicPr>
-        <p:blipFill>
-          <a:blip r:embed="rId22">
-            <a:extLst>
-              <a:ext uri="{96DAC541-7B7A-43D3-8B79-37D633B846F1}">
-                <asvg:svgBlip xmlns:asvg="http://schemas.microsoft.com/office/drawing/2016/SVG/main" r:embed="rId23"/>
-              </a:ext>
-            </a:extLst>
-          </a:blip>
-          <a:stretch>
-            <a:fillRect/>
-          </a:stretch>
-        </p:blipFill>
-        <p:spPr>
-          <a:xfrm>
-            <a:off x="9180861" y="3993610"/>
-            <a:ext cx="591034" cy="591034"/>
-          </a:xfrm>
-          <a:prstGeom prst="rect">
-            <a:avLst/>
-          </a:prstGeom>
-        </p:spPr>
-      </p:pic>
-      <p:sp>
-        <p:nvSpPr>
-          <p:cNvPr id="76" name="TextBox 75">
-            <a:extLst>
-              <a:ext uri="{FF2B5EF4-FFF2-40B4-BE49-F238E27FC236}">
-                <a16:creationId xmlns:a16="http://schemas.microsoft.com/office/drawing/2014/main" id="{1D3FF6A9-7229-194C-B3C7-C83C8AB8EF44}"/>
-              </a:ext>
-            </a:extLst>
-          </p:cNvPr>
-          <p:cNvSpPr txBox="1"/>
-          <p:nvPr/>
-        </p:nvSpPr>
-        <p:spPr>
-          <a:xfrm>
-            <a:off x="4136101" y="4648213"/>
-            <a:ext cx="1335090" cy="461665"/>
-          </a:xfrm>
-          <a:prstGeom prst="rect">
-            <a:avLst/>
-          </a:prstGeom>
-          <a:noFill/>
-        </p:spPr>
-        <p:txBody>
-          <a:bodyPr wrap="square" rtlCol="0">
-            <a:spAutoFit/>
-          </a:bodyPr>
-          <a:lstStyle/>
-          <a:p>
-            <a:pPr algn="ctr"/>
-            <a:r>
-              <a:rPr lang="en-US" sz="1200" dirty="0">
-                <a:latin typeface="Arial" panose="020B0604020202020204" pitchFamily="34" charset="0"/>
-                <a:cs typeface="Arial" panose="020B0604020202020204" pitchFamily="34" charset="0"/>
-              </a:rPr>
-              <a:t>Elastic Load Balancing (ELB)</a:t>
-            </a:r>
-          </a:p>
-        </p:txBody>
-      </p:sp>
-      <p:pic>
-        <p:nvPicPr>
-          <p:cNvPr id="77" name="Graphic 76">
-            <a:extLst>
-              <a:ext uri="{FF2B5EF4-FFF2-40B4-BE49-F238E27FC236}">
-                <a16:creationId xmlns:a16="http://schemas.microsoft.com/office/drawing/2014/main" id="{32CB38C0-100B-9C4B-8CAD-B72AB38B5067}"/>
-              </a:ext>
-            </a:extLst>
-          </p:cNvPr>
-          <p:cNvPicPr>
-            <a:picLocks noChangeAspect="1"/>
-          </p:cNvPicPr>
-          <p:nvPr/>
-        </p:nvPicPr>
-        <p:blipFill>
-          <a:blip r:embed="rId24">
-            <a:extLst>
-              <a:ext uri="{96DAC541-7B7A-43D3-8B79-37D633B846F1}">
-                <asvg:svgBlip xmlns:asvg="http://schemas.microsoft.com/office/drawing/2016/SVG/main" r:embed="rId25"/>
-              </a:ext>
-            </a:extLst>
-          </a:blip>
-          <a:stretch>
-            <a:fillRect/>
-          </a:stretch>
-        </p:blipFill>
-        <p:spPr>
-          <a:xfrm>
-            <a:off x="4539707" y="4057375"/>
-            <a:ext cx="591034" cy="591034"/>
-          </a:xfrm>
-          <a:prstGeom prst="rect">
-            <a:avLst/>
-          </a:prstGeom>
-        </p:spPr>
-      </p:pic>
       <p:sp>
         <p:nvSpPr>
           <p:cNvPr id="80" name="Rectangle 79">
@@ -2219,7 +1863,7 @@
         </p:nvSpPr>
         <p:spPr>
           <a:xfrm>
-            <a:off x="5671319" y="3659964"/>
+            <a:off x="4332852" y="3659964"/>
             <a:ext cx="2470969" cy="1424609"/>
           </a:xfrm>
           <a:prstGeom prst="rect">
@@ -2288,7 +1932,7 @@
         </p:nvSpPr>
         <p:spPr>
           <a:xfrm>
-            <a:off x="5517334" y="798579"/>
+            <a:off x="4178867" y="798579"/>
             <a:ext cx="2782099" cy="4586222"/>
           </a:xfrm>
           <a:prstGeom prst="rect">
@@ -2356,10 +2000,10 @@
           <p:nvPr/>
         </p:nvPicPr>
         <p:blipFill>
-          <a:blip r:embed="rId10">
+          <a:blip r:embed="rId6">
             <a:extLst>
               <a:ext uri="{96DAC541-7B7A-43D3-8B79-37D633B846F1}">
-                <asvg:svgBlip xmlns:asvg="http://schemas.microsoft.com/office/drawing/2016/SVG/main" r:embed="rId11"/>
+                <asvg:svgBlip xmlns:asvg="http://schemas.microsoft.com/office/drawing/2016/SVG/main" r:embed="rId7"/>
               </a:ext>
             </a:extLst>
           </a:blip>
@@ -2369,7 +2013,7 @@
         </p:blipFill>
         <p:spPr>
           <a:xfrm>
-            <a:off x="5682206" y="1560952"/>
+            <a:off x="4343739" y="1560952"/>
             <a:ext cx="274320" cy="274320"/>
           </a:xfrm>
           <a:prstGeom prst="rect">
@@ -2392,10 +2036,10 @@
           <p:nvPr/>
         </p:nvPicPr>
         <p:blipFill>
-          <a:blip r:embed="rId12">
+          <a:blip r:embed="rId8">
             <a:extLst>
               <a:ext uri="{96DAC541-7B7A-43D3-8B79-37D633B846F1}">
-                <asvg:svgBlip xmlns:asvg="http://schemas.microsoft.com/office/drawing/2016/SVG/main" r:embed="rId13"/>
+                <asvg:svgBlip xmlns:asvg="http://schemas.microsoft.com/office/drawing/2016/SVG/main" r:embed="rId9"/>
               </a:ext>
             </a:extLst>
           </a:blip>
@@ -2405,7 +2049,7 @@
         </p:blipFill>
         <p:spPr>
           <a:xfrm>
-            <a:off x="5673043" y="3654589"/>
+            <a:off x="4334576" y="3654589"/>
             <a:ext cx="274320" cy="274320"/>
           </a:xfrm>
           <a:prstGeom prst="rect">
@@ -2427,7 +2071,7 @@
         </p:nvSpPr>
         <p:spPr>
           <a:xfrm>
-            <a:off x="7002417" y="2739378"/>
+            <a:off x="5001591" y="2681210"/>
             <a:ext cx="1159225" cy="276999"/>
           </a:xfrm>
           <a:prstGeom prst="rect">
@@ -2467,10 +2111,10 @@
           <p:nvPr/>
         </p:nvPicPr>
         <p:blipFill>
-          <a:blip r:embed="rId14">
+          <a:blip r:embed="rId10">
             <a:extLst>
               <a:ext uri="{96DAC541-7B7A-43D3-8B79-37D633B846F1}">
-                <asvg:svgBlip xmlns:asvg="http://schemas.microsoft.com/office/drawing/2016/SVG/main" r:embed="rId15"/>
+                <asvg:svgBlip xmlns:asvg="http://schemas.microsoft.com/office/drawing/2016/SVG/main" r:embed="rId11"/>
               </a:ext>
             </a:extLst>
           </a:blip>
@@ -2480,7 +2124,7 @@
         </p:blipFill>
         <p:spPr>
           <a:xfrm>
-            <a:off x="7338102" y="2280711"/>
+            <a:off x="5346253" y="2222081"/>
             <a:ext cx="469900" cy="469900"/>
           </a:xfrm>
           <a:prstGeom prst="rect">
@@ -2490,10 +2134,130 @@
       </p:pic>
       <p:pic>
         <p:nvPicPr>
-          <p:cNvPr id="86" name="Graphic 85">
+          <p:cNvPr id="39" name="Graphic 12">
             <a:extLst>
               <a:ext uri="{FF2B5EF4-FFF2-40B4-BE49-F238E27FC236}">
-                <a16:creationId xmlns:a16="http://schemas.microsoft.com/office/drawing/2014/main" id="{3D700715-47D9-5246-88FA-F08E1FB81C35}"/>
+                <a16:creationId xmlns:a16="http://schemas.microsoft.com/office/drawing/2014/main" id="{68EEF4FA-FA0E-3645-8AC7-E9529BF7011C}"/>
+              </a:ext>
+            </a:extLst>
+          </p:cNvPr>
+          <p:cNvPicPr>
+            <a:picLocks noChangeAspect="1" noChangeArrowheads="1"/>
+          </p:cNvPicPr>
+          <p:nvPr/>
+        </p:nvPicPr>
+        <p:blipFill>
+          <a:blip r:embed="rId12">
+            <a:extLst>
+              <a:ext uri="{28A0092B-C50C-407E-A947-70E740481C1C}">
+                <a14:useLocalDpi xmlns:a14="http://schemas.microsoft.com/office/drawing/2010/main" val="0"/>
+              </a:ext>
+            </a:extLst>
+          </a:blip>
+          <a:srcRect/>
+          <a:stretch>
+            <a:fillRect/>
+          </a:stretch>
+        </p:blipFill>
+        <p:spPr bwMode="auto">
+          <a:xfrm>
+            <a:off x="9430489" y="4128423"/>
+            <a:ext cx="469900" cy="469900"/>
+          </a:xfrm>
+          <a:prstGeom prst="rect">
+            <a:avLst/>
+          </a:prstGeom>
+          <a:noFill/>
+          <a:ln>
+            <a:noFill/>
+          </a:ln>
+          <a:extLst>
+            <a:ext uri="{909E8E84-426E-40DD-AFC4-6F175D3DCCD1}">
+              <a14:hiddenFill xmlns:a14="http://schemas.microsoft.com/office/drawing/2010/main">
+                <a:solidFill>
+                  <a:srgbClr val="FFFFFF"/>
+                </a:solidFill>
+              </a14:hiddenFill>
+            </a:ext>
+            <a:ext uri="{91240B29-F687-4F45-9708-019B960494DF}">
+              <a14:hiddenLine xmlns:a14="http://schemas.microsoft.com/office/drawing/2010/main" w="9525">
+                <a:solidFill>
+                  <a:srgbClr val="000000"/>
+                </a:solidFill>
+                <a:miter lim="800000"/>
+                <a:headEnd/>
+                <a:tailEnd/>
+              </a14:hiddenLine>
+            </a:ext>
+          </a:extLst>
+        </p:spPr>
+      </p:pic>
+      <p:pic>
+        <p:nvPicPr>
+          <p:cNvPr id="40" name="Graphic 15">
+            <a:extLst>
+              <a:ext uri="{FF2B5EF4-FFF2-40B4-BE49-F238E27FC236}">
+                <a16:creationId xmlns:a16="http://schemas.microsoft.com/office/drawing/2014/main" id="{F1D040D2-EB5E-1841-8571-FE33D1C15745}"/>
+              </a:ext>
+            </a:extLst>
+          </p:cNvPr>
+          <p:cNvPicPr>
+            <a:picLocks noChangeAspect="1" noChangeArrowheads="1"/>
+          </p:cNvPicPr>
+          <p:nvPr/>
+        </p:nvPicPr>
+        <p:blipFill>
+          <a:blip r:embed="rId13">
+            <a:extLst>
+              <a:ext uri="{28A0092B-C50C-407E-A947-70E740481C1C}">
+                <a14:useLocalDpi xmlns:a14="http://schemas.microsoft.com/office/drawing/2010/main" val="0"/>
+              </a:ext>
+            </a:extLst>
+          </a:blip>
+          <a:srcRect/>
+          <a:stretch>
+            <a:fillRect/>
+          </a:stretch>
+        </p:blipFill>
+        <p:spPr bwMode="auto">
+          <a:xfrm>
+            <a:off x="7741523" y="2097981"/>
+            <a:ext cx="594000" cy="594000"/>
+          </a:xfrm>
+          <a:prstGeom prst="rect">
+            <a:avLst/>
+          </a:prstGeom>
+          <a:noFill/>
+          <a:ln>
+            <a:noFill/>
+          </a:ln>
+          <a:extLst>
+            <a:ext uri="{909E8E84-426E-40DD-AFC4-6F175D3DCCD1}">
+              <a14:hiddenFill xmlns:a14="http://schemas.microsoft.com/office/drawing/2010/main">
+                <a:solidFill>
+                  <a:srgbClr val="FFFFFF"/>
+                </a:solidFill>
+              </a14:hiddenFill>
+            </a:ext>
+            <a:ext uri="{91240B29-F687-4F45-9708-019B960494DF}">
+              <a14:hiddenLine xmlns:a14="http://schemas.microsoft.com/office/drawing/2010/main" w="9525">
+                <a:solidFill>
+                  <a:srgbClr val="000000"/>
+                </a:solidFill>
+                <a:miter lim="800000"/>
+                <a:headEnd/>
+                <a:tailEnd/>
+              </a14:hiddenLine>
+            </a:ext>
+          </a:extLst>
+        </p:spPr>
+      </p:pic>
+      <p:pic>
+        <p:nvPicPr>
+          <p:cNvPr id="42" name="Graphic 41">
+            <a:extLst>
+              <a:ext uri="{FF2B5EF4-FFF2-40B4-BE49-F238E27FC236}">
+                <a16:creationId xmlns:a16="http://schemas.microsoft.com/office/drawing/2014/main" id="{2FE6E347-A371-5E4A-9C9F-A35027A1A87E}"/>
               </a:ext>
             </a:extLst>
           </p:cNvPr>
@@ -2503,10 +2267,10 @@
           <p:nvPr/>
         </p:nvPicPr>
         <p:blipFill>
-          <a:blip r:embed="rId18">
+          <a:blip r:embed="rId14">
             <a:extLst>
               <a:ext uri="{96DAC541-7B7A-43D3-8B79-37D633B846F1}">
-                <asvg:svgBlip xmlns:asvg="http://schemas.microsoft.com/office/drawing/2016/SVG/main" r:embed="rId19"/>
+                <asvg:svgBlip xmlns:asvg="http://schemas.microsoft.com/office/drawing/2016/SVG/main" r:embed="rId15"/>
               </a:ext>
             </a:extLst>
           </a:blip>
@@ -2516,7 +2280,7 @@
         </p:blipFill>
         <p:spPr>
           <a:xfrm>
-            <a:off x="6585447" y="4090316"/>
+            <a:off x="5333386" y="4128423"/>
             <a:ext cx="469900" cy="469900"/>
           </a:xfrm>
           <a:prstGeom prst="rect">
@@ -2526,10 +2290,10 @@
       </p:pic>
       <p:sp>
         <p:nvSpPr>
-          <p:cNvPr id="87" name="TextBox 86">
+          <p:cNvPr id="43" name="TextBox 42">
             <a:extLst>
               <a:ext uri="{FF2B5EF4-FFF2-40B4-BE49-F238E27FC236}">
-                <a16:creationId xmlns:a16="http://schemas.microsoft.com/office/drawing/2014/main" id="{D0B8101C-698F-D449-84DD-EA8E3EF5513B}"/>
+                <a16:creationId xmlns:a16="http://schemas.microsoft.com/office/drawing/2014/main" id="{A91E408D-561C-AB4E-AB77-CCEC1DE4A2F8}"/>
               </a:ext>
             </a:extLst>
           </p:cNvPr>
@@ -2538,8 +2302,8 @@
         </p:nvSpPr>
         <p:spPr>
           <a:xfrm>
-            <a:off x="6063744" y="4586949"/>
-            <a:ext cx="1513305" cy="461665"/>
+            <a:off x="5014995" y="4596403"/>
+            <a:ext cx="1132415" cy="461665"/>
           </a:xfrm>
           <a:prstGeom prst="rect">
             <a:avLst/>
@@ -2547,7 +2311,7 @@
           <a:noFill/>
         </p:spPr>
         <p:txBody>
-          <a:bodyPr wrap="square" rtlCol="0">
+          <a:bodyPr wrap="square" rtlCol="0" anchor="t">
             <a:spAutoFit/>
           </a:bodyPr>
           <a:lstStyle/>
@@ -2558,30 +2322,31 @@
                 <a:latin typeface="Arial" panose="020B0604020202020204" pitchFamily="34" charset="0"/>
                 <a:cs typeface="Arial" panose="020B0604020202020204" pitchFamily="34" charset="0"/>
               </a:rPr>
-              <a:t>&lt;Your product instances&gt;</a:t>
+              <a:t>RHEL 8 Local Mirror Server</a:t>
             </a:r>
           </a:p>
         </p:txBody>
       </p:sp>
       <p:cxnSp>
         <p:nvCxnSpPr>
-          <p:cNvPr id="90" name="Straight Arrow Connector 89">
+          <p:cNvPr id="46" name="Straight Arrow Connector 45">
             <a:extLst>
               <a:ext uri="{FF2B5EF4-FFF2-40B4-BE49-F238E27FC236}">
-                <a16:creationId xmlns:a16="http://schemas.microsoft.com/office/drawing/2014/main" id="{9EA36EAB-59FC-A349-9D12-785D550553AB}"/>
+                <a16:creationId xmlns:a16="http://schemas.microsoft.com/office/drawing/2014/main" id="{3F552B6E-B880-DC43-A704-CECAEA7F194B}"/>
               </a:ext>
             </a:extLst>
           </p:cNvPr>
           <p:cNvCxnSpPr>
             <a:cxnSpLocks/>
-            <a:stCxn id="77" idx="3"/>
+            <a:stCxn id="42" idx="3"/>
+            <a:endCxn id="39" idx="1"/>
           </p:cNvCxnSpPr>
           <p:nvPr/>
         </p:nvCxnSpPr>
         <p:spPr>
           <a:xfrm>
-            <a:off x="5130741" y="4352892"/>
-            <a:ext cx="1356004" cy="0"/>
+            <a:off x="5803286" y="4363373"/>
+            <a:ext cx="3627203" cy="0"/>
           </a:xfrm>
           <a:prstGeom prst="straightConnector1">
             <a:avLst/>
@@ -2590,8 +2355,8 @@
             <a:solidFill>
               <a:srgbClr val="545B64"/>
             </a:solidFill>
-            <a:headEnd type="none" w="med" len="sm"/>
-            <a:tailEnd type="arrow" w="med" len="sm"/>
+            <a:headEnd type="arrow" w="med" len="sm"/>
+            <a:tailEnd type="none" w="med" len="sm"/>
           </a:ln>
         </p:spPr>
         <p:style>
@@ -2609,188 +2374,6 @@
           </a:fontRef>
         </p:style>
       </p:cxnSp>
-      <p:cxnSp>
-        <p:nvCxnSpPr>
-          <p:cNvPr id="91" name="Straight Arrow Connector 90">
-            <a:extLst>
-              <a:ext uri="{FF2B5EF4-FFF2-40B4-BE49-F238E27FC236}">
-                <a16:creationId xmlns:a16="http://schemas.microsoft.com/office/drawing/2014/main" id="{17C62B33-5EE7-2B48-872F-DB9440F578D5}"/>
-              </a:ext>
-            </a:extLst>
-          </p:cNvPr>
-          <p:cNvCxnSpPr>
-            <a:cxnSpLocks/>
-            <a:endCxn id="77" idx="1"/>
-          </p:cNvCxnSpPr>
-          <p:nvPr/>
-        </p:nvCxnSpPr>
-        <p:spPr>
-          <a:xfrm flipV="1">
-            <a:off x="3202660" y="4352892"/>
-            <a:ext cx="1337047" cy="0"/>
-          </a:xfrm>
-          <a:prstGeom prst="straightConnector1">
-            <a:avLst/>
-          </a:prstGeom>
-          <a:ln w="12700">
-            <a:solidFill>
-              <a:srgbClr val="545B64"/>
-            </a:solidFill>
-            <a:headEnd type="arrow" w="med" len="sm"/>
-            <a:tailEnd type="none" w="med" len="sm"/>
-          </a:ln>
-        </p:spPr>
-        <p:style>
-          <a:lnRef idx="1">
-            <a:schemeClr val="accent1"/>
-          </a:lnRef>
-          <a:fillRef idx="0">
-            <a:schemeClr val="accent1"/>
-          </a:fillRef>
-          <a:effectRef idx="0">
-            <a:schemeClr val="accent1"/>
-          </a:effectRef>
-          <a:fontRef idx="minor">
-            <a:schemeClr val="tx1"/>
-          </a:fontRef>
-        </p:style>
-      </p:cxnSp>
-      <p:sp>
-        <p:nvSpPr>
-          <p:cNvPr id="93" name="Rectangle 92">
-            <a:extLst>
-              <a:ext uri="{FF2B5EF4-FFF2-40B4-BE49-F238E27FC236}">
-                <a16:creationId xmlns:a16="http://schemas.microsoft.com/office/drawing/2014/main" id="{6CA34C60-F228-5441-A920-DF94CCB804FA}"/>
-              </a:ext>
-            </a:extLst>
-          </p:cNvPr>
-          <p:cNvSpPr/>
-          <p:nvPr/>
-        </p:nvSpPr>
-        <p:spPr>
-          <a:xfrm>
-            <a:off x="2603276" y="2014715"/>
-            <a:ext cx="4442344" cy="1143000"/>
-          </a:xfrm>
-          <a:prstGeom prst="rect">
-            <a:avLst/>
-          </a:prstGeom>
-          <a:noFill/>
-          <a:ln w="12700">
-            <a:solidFill>
-              <a:srgbClr val="D86613"/>
-            </a:solidFill>
-            <a:prstDash val="dash"/>
-          </a:ln>
-        </p:spPr>
-        <p:style>
-          <a:lnRef idx="2">
-            <a:schemeClr val="accent1">
-              <a:shade val="50000"/>
-            </a:schemeClr>
-          </a:lnRef>
-          <a:fillRef idx="1">
-            <a:schemeClr val="accent1"/>
-          </a:fillRef>
-          <a:effectRef idx="0">
-            <a:schemeClr val="accent1"/>
-          </a:effectRef>
-          <a:fontRef idx="minor">
-            <a:schemeClr val="lt1"/>
-          </a:fontRef>
-        </p:style>
-        <p:txBody>
-          <a:bodyPr rot="0" spcFirstLastPara="0" vertOverflow="overflow" horzOverflow="overflow" vert="horz" wrap="square" lIns="91440" tIns="91440" rIns="91440" bIns="45720" numCol="1" spcCol="0" rtlCol="0" fromWordArt="0" anchor="t" anchorCtr="0" forceAA="0" compatLnSpc="1">
-            <a:prstTxWarp prst="textNoShape">
-              <a:avLst/>
-            </a:prstTxWarp>
-            <a:noAutofit/>
-          </a:bodyPr>
-          <a:lstStyle/>
-          <a:p>
-            <a:pPr algn="ctr"/>
-            <a:endParaRPr lang="en-US" sz="1200" dirty="0">
-              <a:solidFill>
-                <a:srgbClr val="D86613"/>
-              </a:solidFill>
-            </a:endParaRPr>
-          </a:p>
-          <a:p>
-            <a:pPr algn="ctr"/>
-            <a:endParaRPr lang="en-US" sz="1200" dirty="0">
-              <a:solidFill>
-                <a:srgbClr val="D86613"/>
-              </a:solidFill>
-            </a:endParaRPr>
-          </a:p>
-          <a:p>
-            <a:pPr algn="ctr">
-              <a:tabLst>
-                <a:tab pos="3475038" algn="l"/>
-              </a:tabLst>
-            </a:pPr>
-            <a:r>
-              <a:rPr lang="en-US" sz="1200" dirty="0">
-                <a:solidFill>
-                  <a:srgbClr val="D86613"/>
-                </a:solidFill>
-                <a:latin typeface="Arial" panose="020B0604020202020204" pitchFamily="34" charset="0"/>
-                <a:cs typeface="Arial" panose="020B0604020202020204" pitchFamily="34" charset="0"/>
-              </a:rPr>
-              <a:t>Auto Scaling group</a:t>
-            </a:r>
-          </a:p>
-        </p:txBody>
-      </p:sp>
-      <p:sp>
-        <p:nvSpPr>
-          <p:cNvPr id="5" name="TextBox 4">
-            <a:extLst>
-              <a:ext uri="{FF2B5EF4-FFF2-40B4-BE49-F238E27FC236}">
-                <a16:creationId xmlns:a16="http://schemas.microsoft.com/office/drawing/2014/main" id="{13223671-8F0C-D24C-A166-AE97972BD013}"/>
-              </a:ext>
-            </a:extLst>
-          </p:cNvPr>
-          <p:cNvSpPr txBox="1"/>
-          <p:nvPr/>
-        </p:nvSpPr>
-        <p:spPr>
-          <a:xfrm>
-            <a:off x="9311797" y="120699"/>
-            <a:ext cx="2750358" cy="2585323"/>
-          </a:xfrm>
-          <a:prstGeom prst="rect">
-            <a:avLst/>
-          </a:prstGeom>
-          <a:solidFill>
-            <a:schemeClr val="bg1">
-              <a:lumMod val="90000"/>
-            </a:schemeClr>
-          </a:solidFill>
-        </p:spPr>
-        <p:txBody>
-          <a:bodyPr wrap="square" rtlCol="0">
-            <a:spAutoFit/>
-          </a:bodyPr>
-          <a:lstStyle/>
-          <a:p>
-            <a:r>
-              <a:rPr lang="en-US" dirty="0"/>
-              <a:t>This is a starter file for you to create your own diagrams. For the full set of icons, instructions, etc., download the toolkit for PowerPoint from the </a:t>
-            </a:r>
-            <a:r>
-              <a:rPr lang="en-US" dirty="0">
-                <a:hlinkClick r:id="rId26"/>
-              </a:rPr>
-              <a:t>AWS Architecture Icons</a:t>
-            </a:r>
-            <a:r>
-              <a:rPr lang="en-US" dirty="0"/>
-              <a:t> page. Copy and paste from there to here.</a:t>
-            </a:r>
-          </a:p>
-        </p:txBody>
-      </p:sp>
     </p:spTree>
     <p:extLst>
       <p:ext uri="{BB962C8B-B14F-4D97-AF65-F5344CB8AC3E}">

</xml_diff>